<commit_message>
Mes essais Python + Ma nouvelle application et essais
</commit_message>
<xml_diff>
--- a/BreweryAndCo.pptx
+++ b/BreweryAndCo.pptx
@@ -1037,6 +1037,13 @@
         </dgm:presLayoutVars>
       </dgm:prSet>
       <dgm:spPr/>
+      <dgm:t>
+        <a:bodyPr/>
+        <a:lstStyle/>
+        <a:p>
+          <a:endParaRPr lang="fr-FR"/>
+        </a:p>
+      </dgm:t>
     </dgm:pt>
     <dgm:pt modelId="{E0AB52AF-E407-0647-9AF8-A62AE358A121}" type="pres">
       <dgm:prSet presAssocID="{9F8A2660-988F-DA48-ABF3-531D7A12A356}" presName="parTxOnlySpace" presStyleCnt="0"/>
@@ -1051,6 +1058,13 @@
         </dgm:presLayoutVars>
       </dgm:prSet>
       <dgm:spPr/>
+      <dgm:t>
+        <a:bodyPr/>
+        <a:lstStyle/>
+        <a:p>
+          <a:endParaRPr lang="fr-FR"/>
+        </a:p>
+      </dgm:t>
     </dgm:pt>
     <dgm:pt modelId="{3939E6C8-F19B-4C40-B92C-005759217C5D}" type="pres">
       <dgm:prSet presAssocID="{22C2EEFA-BBB1-6642-ABB6-29155384830B}" presName="parTxOnlySpace" presStyleCnt="0"/>
@@ -2810,7 +2824,7 @@
           <a:p>
             <a:fld id="{76B3F2C8-1B63-984A-8C9D-2402B4577158}" type="datetimeFigureOut">
               <a:rPr lang="fr-FR" smtClean="0"/>
-              <a:t>25/05/2016</a:t>
+              <a:t>30/05/2016</a:t>
             </a:fld>
             <a:endParaRPr lang="fr-FR"/>
           </a:p>
@@ -2975,7 +2989,7 @@
           <a:p>
             <a:fld id="{FA4CF6AE-097E-314A-AF67-34E683B9D313}" type="datetimeFigureOut">
               <a:rPr lang="fr-FR" smtClean="0"/>
-              <a:t>25/05/2016</a:t>
+              <a:t>30/05/2016</a:t>
             </a:fld>
             <a:endParaRPr lang="fr-FR"/>
           </a:p>
@@ -7109,15 +7123,7 @@
           <a:p>
             <a:r>
               <a:rPr lang="fr-FR" dirty="0" smtClean="0"/>
-              <a:t>Eau : </a:t>
-            </a:r>
-            <a:r>
-              <a:rPr lang="fr-FR" dirty="0" smtClean="0"/>
-              <a:t>1.50</a:t>
-            </a:r>
-            <a:r>
-              <a:rPr lang="fr-FR" dirty="0" smtClean="0"/>
-              <a:t>/m</a:t>
+              <a:t>Eau : 1.50/m</a:t>
             </a:r>
             <a:r>
               <a:rPr lang="fr-FR" baseline="30000" dirty="0" smtClean="0"/>
@@ -7128,52 +7134,25 @@
           <a:p>
             <a:r>
               <a:rPr lang="fr-FR" dirty="0" smtClean="0"/>
-              <a:t>Malt d’orge </a:t>
-            </a:r>
+              <a:t>Malt d’orge 15.-/25kg</a:t>
+            </a:r>
+          </a:p>
+          <a:p>
             <a:r>
               <a:rPr lang="fr-FR" dirty="0" smtClean="0"/>
-              <a:t>15.-/25kg</a:t>
-            </a:r>
-            <a:endParaRPr lang="fr-FR" dirty="0" smtClean="0"/>
+              <a:t>Malt d’orge Bio 22.-/30kg</a:t>
+            </a:r>
           </a:p>
           <a:p>
             <a:r>
               <a:rPr lang="fr-FR" dirty="0" smtClean="0"/>
-              <a:t>Malt d’orge Bio </a:t>
-            </a:r>
+              <a:t>Malt de formant 11.-/25kg</a:t>
+            </a:r>
+          </a:p>
+          <a:p>
             <a:r>
               <a:rPr lang="fr-FR" dirty="0" smtClean="0"/>
-              <a:t>22</a:t>
-            </a:r>
-            <a:r>
-              <a:rPr lang="fr-FR" dirty="0" smtClean="0"/>
-              <a:t>.-/30kg</a:t>
-            </a:r>
-            <a:endParaRPr lang="fr-FR" dirty="0" smtClean="0"/>
-          </a:p>
-          <a:p>
-            <a:r>
-              <a:rPr lang="fr-FR" dirty="0" smtClean="0"/>
-              <a:t>Malt de formant </a:t>
-            </a:r>
-            <a:r>
-              <a:rPr lang="fr-FR" dirty="0" smtClean="0"/>
-              <a:t>11.-/25kg</a:t>
-            </a:r>
-            <a:endParaRPr lang="fr-FR" dirty="0" smtClean="0"/>
-          </a:p>
-          <a:p>
-            <a:r>
-              <a:rPr lang="fr-FR" dirty="0" smtClean="0"/>
-              <a:t>Houblon </a:t>
-            </a:r>
-            <a:r>
-              <a:rPr lang="fr-FR" dirty="0" smtClean="0"/>
-              <a:t>18</a:t>
-            </a:r>
-            <a:r>
-              <a:rPr lang="fr-FR" dirty="0" smtClean="0"/>
-              <a:t>.-/kg</a:t>
+              <a:t>Houblon 18.-/kg</a:t>
             </a:r>
           </a:p>
           <a:p>
@@ -7181,20 +7160,11 @@
               <a:rPr lang="fr-FR" dirty="0" smtClean="0"/>
               <a:t>Houblon Bio 27.-/kg</a:t>
             </a:r>
-            <a:endParaRPr lang="fr-FR" dirty="0" smtClean="0"/>
           </a:p>
           <a:p>
             <a:r>
               <a:rPr lang="fr-FR" dirty="0" smtClean="0"/>
-              <a:t>Levure </a:t>
-            </a:r>
-            <a:r>
-              <a:rPr lang="fr-FR" dirty="0" smtClean="0"/>
-              <a:t>250</a:t>
-            </a:r>
-            <a:r>
-              <a:rPr lang="fr-FR" dirty="0" smtClean="0"/>
-              <a:t>.-/kg</a:t>
+              <a:t>Levure 250.-/kg</a:t>
             </a:r>
           </a:p>
           <a:p>
@@ -7202,36 +7172,18 @@
               <a:rPr lang="fr-FR" dirty="0" smtClean="0"/>
               <a:t>Levure Bio 275.-/kg</a:t>
             </a:r>
-            <a:endParaRPr lang="fr-FR" dirty="0" smtClean="0"/>
           </a:p>
           <a:p>
             <a:r>
               <a:rPr lang="fr-FR" dirty="0" smtClean="0"/>
-              <a:t>Miel à </a:t>
-            </a:r>
+              <a:t>Miel à 10.-/kg</a:t>
+            </a:r>
+          </a:p>
+          <a:p>
             <a:r>
               <a:rPr lang="fr-FR" dirty="0" smtClean="0"/>
-              <a:t>10.-/kg</a:t>
-            </a:r>
-          </a:p>
-          <a:p>
-            <a:r>
-              <a:rPr lang="fr-FR" dirty="0" smtClean="0"/>
-              <a:t>Bouquet </a:t>
-            </a:r>
-            <a:r>
-              <a:rPr lang="fr-FR" dirty="0" smtClean="0"/>
-              <a:t>d’épice à </a:t>
-            </a:r>
-            <a:r>
-              <a:rPr lang="fr-FR" dirty="0" smtClean="0"/>
-              <a:t>0.20/</a:t>
-            </a:r>
-            <a:r>
-              <a:rPr lang="fr-FR" dirty="0" smtClean="0"/>
-              <a:t>bouquet de 25 grammes</a:t>
-            </a:r>
-            <a:endParaRPr lang="fr-FR" dirty="0" smtClean="0"/>
+              <a:t>Bouquet d’épice à 0.20/bouquet de 25 grammes</a:t>
+            </a:r>
           </a:p>
           <a:p>
             <a:endParaRPr lang="fr-FR" dirty="0" smtClean="0"/>
@@ -7351,29 +7303,13 @@
             </a:r>
             <a:r>
               <a:rPr lang="fr-FR" dirty="0" smtClean="0"/>
-              <a:t> d’une contenance de 50 cl revient au prix de </a:t>
-            </a:r>
+              <a:t> d’une contenance de 50 cl revient au prix de 0.01 cts de CHF l’unité</a:t>
+            </a:r>
+          </a:p>
+          <a:p>
             <a:r>
               <a:rPr lang="fr-FR" dirty="0" smtClean="0"/>
-              <a:t>0.01 </a:t>
-            </a:r>
-            <a:r>
-              <a:rPr lang="fr-FR" dirty="0" smtClean="0"/>
-              <a:t>cts de CHF l’unité</a:t>
-            </a:r>
-          </a:p>
-          <a:p>
-            <a:r>
-              <a:rPr lang="fr-FR" dirty="0" smtClean="0"/>
-              <a:t>Bouteille en verre d’une contenance 25 cl revient au prix de </a:t>
-            </a:r>
-            <a:r>
-              <a:rPr lang="fr-FR" dirty="0" smtClean="0"/>
-              <a:t>0.05 </a:t>
-            </a:r>
-            <a:r>
-              <a:rPr lang="fr-FR" dirty="0" smtClean="0"/>
-              <a:t>cts de CHF l’unité</a:t>
+              <a:t>Bouteille en verre d’une contenance 25 cl revient au prix de 0.05 cts de CHF l’unité</a:t>
             </a:r>
             <a:endParaRPr lang="fr-FR" dirty="0"/>
           </a:p>
@@ -7495,15 +7431,7 @@
             </a:r>
             <a:r>
               <a:rPr lang="fr-FR" dirty="0" smtClean="0"/>
-              <a:t>offrant des conditions de paiement à 30 jours et livre en </a:t>
-            </a:r>
-            <a:r>
-              <a:rPr lang="fr-FR" dirty="0" smtClean="0"/>
-              <a:t>20 jours</a:t>
-            </a:r>
-            <a:r>
-              <a:rPr lang="fr-FR" dirty="0" smtClean="0"/>
-              <a:t>. Il vous fournit en malts et levure</a:t>
+              <a:t>offrant des conditions de paiement à 30 jours et livre en 20 jours. Il vous fournit en malts et levure</a:t>
             </a:r>
           </a:p>
           <a:p>
@@ -7514,11 +7442,7 @@
             </a:r>
             <a:r>
               <a:rPr lang="fr-FR" dirty="0" smtClean="0"/>
-              <a:t>avec paiement à 15 </a:t>
-            </a:r>
-            <a:r>
-              <a:rPr lang="fr-FR" dirty="0" smtClean="0"/>
-              <a:t>jours</a:t>
+              <a:t>avec paiement à 15 jours</a:t>
             </a:r>
             <a:r>
               <a:rPr lang="fr-FR" dirty="0"/>
@@ -7715,15 +7639,7 @@
             </a:r>
             <a:r>
               <a:rPr lang="fr-FR" dirty="0" smtClean="0"/>
-              <a:t>aleur </a:t>
-            </a:r>
-            <a:r>
-              <a:rPr lang="fr-FR" dirty="0" smtClean="0"/>
-              <a:t>de 400’000</a:t>
-            </a:r>
-            <a:r>
-              <a:rPr lang="fr-FR" dirty="0" smtClean="0"/>
-              <a:t>.</a:t>
+              <a:t>aleur de 400’000.</a:t>
             </a:r>
             <a:r>
               <a:rPr lang="fr-CH" dirty="0" smtClean="0"/>
@@ -7756,19 +7672,7 @@
             <a:pPr lvl="1"/>
             <a:r>
               <a:rPr lang="fr-CH" dirty="0" smtClean="0"/>
-              <a:t>Valeur de </a:t>
-            </a:r>
-            <a:r>
-              <a:rPr lang="fr-CH" dirty="0" smtClean="0"/>
-              <a:t>1</a:t>
-            </a:r>
-            <a:r>
-              <a:rPr lang="fr-CH" dirty="0" smtClean="0"/>
-              <a:t>’200’000</a:t>
-            </a:r>
-            <a:r>
-              <a:rPr lang="fr-CH" dirty="0" smtClean="0"/>
-              <a:t>.– CHF</a:t>
+              <a:t>Valeur de 1’200’000.– CHF</a:t>
             </a:r>
           </a:p>
           <a:p>
@@ -7786,27 +7690,7 @@
             <a:pPr lvl="1"/>
             <a:r>
               <a:rPr lang="fr-CH" dirty="0" smtClean="0"/>
-              <a:t>Initialement à </a:t>
-            </a:r>
-            <a:r>
-              <a:rPr lang="fr-CH" dirty="0" smtClean="0"/>
-              <a:t>4.5% </a:t>
-            </a:r>
-            <a:r>
-              <a:rPr lang="fr-CH" dirty="0" smtClean="0"/>
-              <a:t>sur </a:t>
-            </a:r>
-            <a:r>
-              <a:rPr lang="fr-CH" dirty="0" smtClean="0"/>
-              <a:t>25</a:t>
-            </a:r>
-            <a:r>
-              <a:rPr lang="fr-CH" dirty="0" smtClean="0"/>
-              <a:t> </a:t>
-            </a:r>
-            <a:r>
-              <a:rPr lang="fr-CH" dirty="0" smtClean="0"/>
-              <a:t>ans</a:t>
+              <a:t>Initialement à 4.5% sur 25 ans</a:t>
             </a:r>
           </a:p>
         </p:txBody>
@@ -8983,38 +8867,13 @@
             <a:pPr lvl="1"/>
             <a:r>
               <a:rPr lang="fr-FR" dirty="0" smtClean="0"/>
-              <a:t>Pour rappel : </a:t>
-            </a:r>
+              <a:t>Pour rappel : 27’792 kilogrammes de matières première et 72’000 unités </a:t>
+            </a:r>
+          </a:p>
+          <a:p>
             <a:r>
               <a:rPr lang="fr-FR" dirty="0" smtClean="0"/>
-              <a:t>27’792 </a:t>
-            </a:r>
-            <a:r>
-              <a:rPr lang="fr-FR" dirty="0" smtClean="0"/>
-              <a:t>kilogrammes de matières première et </a:t>
-            </a:r>
-            <a:r>
-              <a:rPr lang="fr-FR" dirty="0" smtClean="0"/>
-              <a:t>72</a:t>
-            </a:r>
-            <a:r>
-              <a:rPr lang="fr-FR" dirty="0" smtClean="0"/>
-              <a:t>’000 </a:t>
-            </a:r>
-            <a:r>
-              <a:rPr lang="fr-FR" dirty="0" smtClean="0"/>
-              <a:t>unités </a:t>
-            </a:r>
-            <a:endParaRPr lang="fr-FR" dirty="0" smtClean="0"/>
-          </a:p>
-          <a:p>
-            <a:r>
-              <a:rPr lang="fr-FR" dirty="0" smtClean="0"/>
-              <a:t>Vous </a:t>
-            </a:r>
-            <a:r>
-              <a:rPr lang="fr-FR" dirty="0" smtClean="0"/>
-              <a:t>avez la possibilité d’acquérir de l’espace supplémentaire auprès de </a:t>
+              <a:t>Vous avez la possibilité d’acquérir de l’espace supplémentaire auprès de </a:t>
             </a:r>
             <a:r>
               <a:rPr lang="fr-FR" b="1" dirty="0" err="1" smtClean="0"/>
@@ -9037,22 +8896,14 @@
             <a:pPr lvl="1"/>
             <a:r>
               <a:rPr lang="fr-FR" dirty="0" smtClean="0"/>
-              <a:t>5’000 </a:t>
-            </a:r>
+              <a:t>5’000 kilogrammes sont facturés à 200.- CHF/jour</a:t>
+            </a:r>
+          </a:p>
+          <a:p>
+            <a:pPr lvl="1"/>
             <a:r>
               <a:rPr lang="fr-FR" dirty="0" smtClean="0"/>
-              <a:t>kilogrammes sont facturés à 200.- CHF/jour</a:t>
-            </a:r>
-          </a:p>
-          <a:p>
-            <a:pPr lvl="1"/>
-            <a:r>
-              <a:rPr lang="fr-FR" dirty="0" smtClean="0"/>
-              <a:t>10’000 </a:t>
-            </a:r>
-            <a:r>
-              <a:rPr lang="fr-FR" dirty="0" smtClean="0"/>
-              <a:t>unités sont facturées au prix de 200.- CHF/jour</a:t>
+              <a:t>10’000 unités sont facturées au prix de 200.- CHF/jour</a:t>
             </a:r>
             <a:endParaRPr lang="fr-FR" dirty="0"/>
           </a:p>
@@ -9282,11 +9133,7 @@
           <a:p>
             <a:r>
               <a:rPr lang="fr-FR" dirty="0" smtClean="0"/>
-              <a:t>Frais </a:t>
-            </a:r>
-            <a:r>
-              <a:rPr lang="fr-FR" dirty="0" smtClean="0"/>
-              <a:t>fixes mensuels</a:t>
+              <a:t>Frais fixes mensuels</a:t>
             </a:r>
             <a:endParaRPr lang="fr-FR" dirty="0"/>
           </a:p>
@@ -9309,40 +9156,19 @@
           <a:p>
             <a:r>
               <a:rPr lang="fr-FR" dirty="0" smtClean="0"/>
-              <a:t>Votre société </a:t>
-            </a:r>
+              <a:t>Votre société travaille 5 jours sur 7</a:t>
+            </a:r>
+          </a:p>
+          <a:p>
             <a:r>
               <a:rPr lang="fr-FR" dirty="0" smtClean="0"/>
-              <a:t>travaille 5 jours sur 7</a:t>
-            </a:r>
-            <a:endParaRPr lang="fr-FR" dirty="0" smtClean="0"/>
+              <a:t>10’000.- CHF pour la main d’œuvre direct</a:t>
+            </a:r>
           </a:p>
           <a:p>
             <a:r>
               <a:rPr lang="fr-FR" dirty="0" smtClean="0"/>
-              <a:t>10’000</a:t>
-            </a:r>
-            <a:r>
-              <a:rPr lang="fr-FR" dirty="0" smtClean="0"/>
-              <a:t>.- CHF pour la main d’œuvre </a:t>
-            </a:r>
-            <a:r>
-              <a:rPr lang="fr-FR" dirty="0" smtClean="0"/>
-              <a:t>direct</a:t>
-            </a:r>
-          </a:p>
-          <a:p>
-            <a:r>
-              <a:rPr lang="fr-FR" dirty="0" smtClean="0"/>
-              <a:t>25’000</a:t>
-            </a:r>
-            <a:r>
-              <a:rPr lang="fr-FR" dirty="0" smtClean="0"/>
-              <a:t>.- CHF pour les SG&amp;A (ventes, généraux et administratifs</a:t>
-            </a:r>
-            <a:r>
-              <a:rPr lang="fr-FR" dirty="0" smtClean="0"/>
-              <a:t>)</a:t>
+              <a:t>25’000.- CHF pour les SG&amp;A (ventes, généraux et administratifs)</a:t>
             </a:r>
           </a:p>
           <a:p>
@@ -10518,11 +10344,7 @@
                     <a:p>
                       <a:r>
                         <a:rPr lang="fr-FR" b="0" dirty="0" smtClean="0"/>
-                        <a:t>Malt </a:t>
-                      </a:r>
-                      <a:r>
-                        <a:rPr lang="fr-FR" b="0" dirty="0" smtClean="0"/>
-                        <a:t>d’orge</a:t>
+                        <a:t>Malt d’orge</a:t>
                       </a:r>
                       <a:endParaRPr lang="fr-FR" b="0" dirty="0"/>
                     </a:p>
@@ -11513,11 +11335,7 @@
                       </a:pPr>
                       <a:r>
                         <a:rPr lang="fr-FR" i="1" dirty="0" smtClean="0"/>
-                        <a:t>8 </a:t>
-                      </a:r>
-                      <a:r>
-                        <a:rPr lang="fr-FR" i="1" dirty="0" smtClean="0"/>
-                        <a:t>kg</a:t>
+                        <a:t>8 kg</a:t>
                       </a:r>
                     </a:p>
                   </a:txBody>
@@ -17084,15 +16902,7 @@
             </a:r>
             <a:r>
               <a:rPr lang="fr-FR" dirty="0" smtClean="0"/>
-              <a:t>50</a:t>
-            </a:r>
-            <a:r>
-              <a:rPr lang="fr-FR" dirty="0" smtClean="0"/>
-              <a:t>’000.- CHF de </a:t>
-            </a:r>
-            <a:r>
-              <a:rPr lang="fr-FR" dirty="0" smtClean="0"/>
-              <a:t>liquidité à disposition</a:t>
+              <a:t>50’000.- CHF de liquidité à disposition</a:t>
             </a:r>
           </a:p>
           <a:p>
@@ -17373,11 +17183,7 @@
           <a:p>
             <a:r>
               <a:rPr lang="fr-FR" dirty="0" smtClean="0"/>
-              <a:t>Vous rejoignez une société constituée uniquement de </a:t>
-            </a:r>
-            <a:r>
-              <a:rPr lang="fr-FR" dirty="0" smtClean="0"/>
-              <a:t>main d’œuvre directe, i.e. cinq employé</a:t>
+              <a:t>Vous rejoignez une société constituée uniquement de main d’œuvre directe, i.e. cinq employé</a:t>
             </a:r>
           </a:p>
           <a:p>
@@ -17397,11 +17203,7 @@
           <a:p>
             <a:r>
               <a:rPr lang="fr-CH" dirty="0" smtClean="0"/>
-              <a:t>Vos </a:t>
-            </a:r>
-            <a:r>
-              <a:rPr lang="fr-CH" dirty="0" smtClean="0"/>
-              <a:t>responsabilités sont de rendre efficient les principaux processus opérationnels</a:t>
+              <a:t>Vos responsabilités sont de rendre efficient les principaux processus opérationnels</a:t>
             </a:r>
           </a:p>
           <a:p>
@@ -17528,11 +17330,7 @@
           <a:p>
             <a:r>
               <a:rPr lang="fr-FR" dirty="0" smtClean="0"/>
-              <a:t>Une </a:t>
-            </a:r>
-            <a:r>
-              <a:rPr lang="fr-FR" dirty="0" smtClean="0"/>
-              <a:t>halle de production</a:t>
+              <a:t>Une halle de production</a:t>
             </a:r>
           </a:p>
           <a:p>
@@ -17550,34 +17348,14 @@
             <a:pPr lvl="1"/>
             <a:r>
               <a:rPr lang="fr-FR" dirty="0" smtClean="0"/>
-              <a:t>Valeur de </a:t>
-            </a:r>
+              <a:t>Valeur de 150’000.- CHF par ligne</a:t>
+            </a:r>
+          </a:p>
+          <a:p>
+            <a:pPr lvl="1"/>
             <a:r>
               <a:rPr lang="fr-FR" dirty="0" smtClean="0"/>
-              <a:t>15</a:t>
-            </a:r>
-            <a:r>
-              <a:rPr lang="fr-FR" dirty="0" smtClean="0"/>
-              <a:t>0’000</a:t>
-            </a:r>
-            <a:r>
-              <a:rPr lang="fr-FR" dirty="0" smtClean="0"/>
-              <a:t>.- CHF par ligne</a:t>
-            </a:r>
-          </a:p>
-          <a:p>
-            <a:pPr lvl="1"/>
-            <a:r>
-              <a:rPr lang="fr-FR" dirty="0" smtClean="0"/>
-              <a:t>Capacité mensuelle de </a:t>
-            </a:r>
-            <a:r>
-              <a:rPr lang="fr-FR" dirty="0" smtClean="0"/>
-              <a:t>12’000 </a:t>
-            </a:r>
-            <a:r>
-              <a:rPr lang="fr-FR" dirty="0" smtClean="0"/>
-              <a:t>litres totales</a:t>
+              <a:t>Capacité mensuelle de 12’000 litres totales</a:t>
             </a:r>
           </a:p>
           <a:p>
@@ -17639,11 +17417,7 @@
           <a:p>
             <a:r>
               <a:rPr lang="fr-CH" dirty="0" smtClean="0"/>
-              <a:t>Entrepôt produits finis de 72’000 </a:t>
-            </a:r>
-            <a:r>
-              <a:rPr lang="fr-CH" dirty="0" smtClean="0"/>
-              <a:t>unités</a:t>
+              <a:t>Entrepôt produits finis de 72’000 unités</a:t>
             </a:r>
           </a:p>
           <a:p>
@@ -17721,8 +17495,8 @@
         </p:nvSpPr>
         <p:spPr>
           <a:xfrm>
-            <a:off x="7601487" y="1434172"/>
-            <a:ext cx="3817520" cy="769441"/>
+            <a:off x="6245157" y="1690688"/>
+            <a:ext cx="5108643" cy="646331"/>
           </a:xfrm>
           <a:prstGeom prst="rect">
             <a:avLst/>
@@ -17730,20 +17504,29 @@
           <a:noFill/>
         </p:spPr>
         <p:txBody>
-          <a:bodyPr wrap="none" rtlCol="0">
+          <a:bodyPr wrap="square" rtlCol="0">
             <a:spAutoFit/>
           </a:bodyPr>
           <a:lstStyle/>
           <a:p>
-            <a:r>
-              <a:rPr lang="fr-FR" sz="4400" b="1" dirty="0" smtClean="0">
+            <a:pPr algn="r"/>
+            <a:r>
+              <a:rPr lang="fr-FR" sz="3600" b="1" dirty="0" smtClean="0">
                 <a:solidFill>
                   <a:srgbClr val="A14788"/>
                 </a:solidFill>
               </a:rPr>
-              <a:t>CHF 1’000’000.-</a:t>
-            </a:r>
-            <a:endParaRPr lang="fr-FR" sz="4400" b="1" dirty="0">
+              <a:t>Valeur de </a:t>
+            </a:r>
+            <a:r>
+              <a:rPr lang="fr-FR" sz="3600" b="1" dirty="0" smtClean="0">
+                <a:solidFill>
+                  <a:srgbClr val="A14788"/>
+                </a:solidFill>
+              </a:rPr>
+              <a:t>1’000’000.- CHF</a:t>
+            </a:r>
+            <a:endParaRPr lang="fr-FR" sz="3600" b="1" dirty="0">
               <a:solidFill>
                 <a:srgbClr val="A14788"/>
               </a:solidFill>
@@ -18485,11 +18268,7 @@
             <a:pPr lvl="1"/>
             <a:r>
               <a:rPr lang="fr-FR" dirty="0" smtClean="0"/>
-              <a:t>Levure 6 grammes par </a:t>
-            </a:r>
-            <a:r>
-              <a:rPr lang="fr-FR" dirty="0" smtClean="0"/>
-              <a:t>litre</a:t>
+              <a:t>Levure 6 grammes par litre</a:t>
             </a:r>
           </a:p>
           <a:p>
@@ -18505,7 +18284,6 @@
               <a:rPr lang="fr-FR" dirty="0" smtClean="0"/>
               <a:t>Épices 2 bouquets par litre</a:t>
             </a:r>
-            <a:endParaRPr lang="fr-FR" dirty="0" smtClean="0"/>
           </a:p>
         </p:txBody>
       </p:sp>

</xml_diff>

<commit_message>
Rédactions et amélioration du code
</commit_message>
<xml_diff>
--- a/BreweryAndCo.pptx
+++ b/BreweryAndCo.pptx
@@ -932,15 +932,7 @@
         <a:p>
           <a:r>
             <a:rPr lang="fr-FR" sz="1400" dirty="0" smtClean="0"/>
-            <a:t>Brassage </a:t>
-          </a:r>
-          <a:r>
-            <a:rPr lang="fr-FR" sz="1400" dirty="0" smtClean="0"/>
-            <a:t>– </a:t>
-          </a:r>
-          <a:r>
-            <a:rPr lang="fr-FR" sz="1400" dirty="0" smtClean="0"/>
-            <a:t>5 heures</a:t>
+            <a:t>Brassage – 5 heures</a:t>
           </a:r>
           <a:endParaRPr lang="fr-FR" sz="1400" dirty="0"/>
         </a:p>
@@ -1002,19 +994,7 @@
         <a:p>
           <a:r>
             <a:rPr lang="fr-FR" sz="1400" dirty="0" smtClean="0"/>
-            <a:t>Fermentation </a:t>
-          </a:r>
-          <a:r>
-            <a:rPr lang="fr-FR" sz="1400" dirty="0" smtClean="0"/>
-            <a:t>– </a:t>
-          </a:r>
-          <a:r>
-            <a:rPr lang="fr-FR" sz="1400" dirty="0" smtClean="0"/>
-            <a:t>1 </a:t>
-          </a:r>
-          <a:r>
-            <a:rPr lang="fr-FR" sz="1400" dirty="0" smtClean="0"/>
-            <a:t>jours</a:t>
+            <a:t>Fermentation – 1 jours</a:t>
           </a:r>
           <a:endParaRPr lang="fr-FR" sz="1400" dirty="0"/>
         </a:p>
@@ -1071,19 +1051,7 @@
         <a:p>
           <a:r>
             <a:rPr lang="fr-FR" sz="1400" dirty="0" smtClean="0"/>
-            <a:t>Garde </a:t>
-          </a:r>
-          <a:r>
-            <a:rPr lang="fr-FR" sz="1400" dirty="0" smtClean="0"/>
-            <a:t>- </a:t>
-          </a:r>
-          <a:r>
-            <a:rPr lang="fr-FR" sz="1400" dirty="0" smtClean="0"/>
-            <a:t>4 </a:t>
-          </a:r>
-          <a:r>
-            <a:rPr lang="fr-FR" sz="1400" dirty="0" smtClean="0"/>
-            <a:t>jours</a:t>
+            <a:t>Garde - 4 jours</a:t>
           </a:r>
           <a:endParaRPr lang="fr-FR" sz="1400" dirty="0"/>
         </a:p>
@@ -1295,15 +1263,7 @@
           </a:pPr>
           <a:r>
             <a:rPr lang="fr-FR" sz="1400" kern="1200" dirty="0" smtClean="0"/>
-            <a:t>Brassage </a:t>
-          </a:r>
-          <a:r>
-            <a:rPr lang="fr-FR" sz="1400" kern="1200" dirty="0" smtClean="0"/>
-            <a:t>– </a:t>
-          </a:r>
-          <a:r>
-            <a:rPr lang="fr-FR" sz="1400" kern="1200" dirty="0" smtClean="0"/>
-            <a:t>5 heures</a:t>
+            <a:t>Brassage – 5 heures</a:t>
           </a:r>
           <a:endParaRPr lang="fr-FR" sz="1400" kern="1200" dirty="0"/>
         </a:p>
@@ -1400,19 +1360,7 @@
           </a:pPr>
           <a:r>
             <a:rPr lang="fr-FR" sz="1400" kern="1200" dirty="0" smtClean="0"/>
-            <a:t>Fermentation </a:t>
-          </a:r>
-          <a:r>
-            <a:rPr lang="fr-FR" sz="1400" kern="1200" dirty="0" smtClean="0"/>
-            <a:t>– </a:t>
-          </a:r>
-          <a:r>
-            <a:rPr lang="fr-FR" sz="1400" kern="1200" dirty="0" smtClean="0"/>
-            <a:t>1 </a:t>
-          </a:r>
-          <a:r>
-            <a:rPr lang="fr-FR" sz="1400" kern="1200" dirty="0" smtClean="0"/>
-            <a:t>jours</a:t>
+            <a:t>Fermentation – 1 jours</a:t>
           </a:r>
           <a:endParaRPr lang="fr-FR" sz="1400" kern="1200" dirty="0"/>
         </a:p>
@@ -1504,19 +1452,7 @@
           </a:pPr>
           <a:r>
             <a:rPr lang="fr-FR" sz="1400" kern="1200" dirty="0" smtClean="0"/>
-            <a:t>Garde </a:t>
-          </a:r>
-          <a:r>
-            <a:rPr lang="fr-FR" sz="1400" kern="1200" dirty="0" smtClean="0"/>
-            <a:t>- </a:t>
-          </a:r>
-          <a:r>
-            <a:rPr lang="fr-FR" sz="1400" kern="1200" dirty="0" smtClean="0"/>
-            <a:t>4 </a:t>
-          </a:r>
-          <a:r>
-            <a:rPr lang="fr-FR" sz="1400" kern="1200" dirty="0" smtClean="0"/>
-            <a:t>jours</a:t>
+            <a:t>Garde - 4 jours</a:t>
           </a:r>
           <a:endParaRPr lang="fr-FR" sz="1400" kern="1200" dirty="0"/>
         </a:p>
@@ -2929,7 +2865,7 @@
           <a:p>
             <a:fld id="{76B3F2C8-1B63-984A-8C9D-2402B4577158}" type="datetimeFigureOut">
               <a:rPr lang="fr-FR" smtClean="0"/>
-              <a:t>10/06/2016</a:t>
+              <a:t>16/06/2016</a:t>
             </a:fld>
             <a:endParaRPr lang="fr-FR"/>
           </a:p>
@@ -3094,7 +3030,7 @@
           <a:p>
             <a:fld id="{FA4CF6AE-097E-314A-AF67-34E683B9D313}" type="datetimeFigureOut">
               <a:rPr lang="fr-FR" smtClean="0"/>
-              <a:t>10/06/2016</a:t>
+              <a:t>16/06/2016</a:t>
             </a:fld>
             <a:endParaRPr lang="fr-FR"/>
           </a:p>
@@ -7257,31 +7193,7 @@
                   <a:srgbClr val="A14788"/>
                 </a:solidFill>
               </a:rPr>
-              <a:t>Un jeu </a:t>
-            </a:r>
-            <a:r>
-              <a:rPr lang="fr-FR" sz="1800" dirty="0" smtClean="0">
-                <a:solidFill>
-                  <a:srgbClr val="A14788"/>
-                </a:solidFill>
-              </a:rPr>
-              <a:t>sérieux destiné à se former à la </a:t>
-            </a:r>
-            <a:r>
-              <a:rPr lang="fr-FR" sz="1800" dirty="0" smtClean="0">
-                <a:solidFill>
-                  <a:srgbClr val="A14788"/>
-                </a:solidFill>
-              </a:rPr>
-              <a:t>gestion </a:t>
-            </a:r>
-            <a:r>
-              <a:rPr lang="fr-FR" sz="1800" dirty="0" smtClean="0">
-                <a:solidFill>
-                  <a:srgbClr val="A14788"/>
-                </a:solidFill>
-              </a:rPr>
-              <a:t>d’entreprise</a:t>
+              <a:t>Un jeu sérieux destiné à se former à la gestion d’entreprise</a:t>
             </a:r>
           </a:p>
           <a:p>
@@ -7718,7 +7630,7 @@
             </a:r>
             <a:r>
               <a:rPr lang="fr-FR" dirty="0" smtClean="0"/>
-              <a:t>offrant des conditions de paiement à 30 jours et livre en 20 jours. Il vous fournit en malts et levure</a:t>
+              <a:t>offrant des conditions de paiement à 30 jours et livre en 15 jours. Il vous fournit en malts et levure</a:t>
             </a:r>
           </a:p>
           <a:p>
@@ -8055,7 +7967,7 @@
           <a:p>
             <a:r>
               <a:rPr lang="fr-FR" dirty="0" smtClean="0"/>
-              <a:t>Vos revendeurs</a:t>
+              <a:t>Vos revendeurs et les parts de marchés</a:t>
             </a:r>
             <a:endParaRPr lang="fr-FR" dirty="0"/>
           </a:p>
@@ -8328,7 +8240,7 @@
         </p:nvSpPr>
         <p:spPr>
           <a:xfrm>
-            <a:off x="6452686" y="3018546"/>
+            <a:off x="6487192" y="2742498"/>
             <a:ext cx="720000" cy="720000"/>
           </a:xfrm>
           <a:prstGeom prst="ellipse">
@@ -8396,7 +8308,7 @@
         </p:nvSpPr>
         <p:spPr>
           <a:xfrm>
-            <a:off x="6499664" y="2441737"/>
+            <a:off x="6430652" y="2182942"/>
             <a:ext cx="540000" cy="540000"/>
           </a:xfrm>
           <a:prstGeom prst="ellipse">
@@ -8462,7 +8374,7 @@
         </p:nvSpPr>
         <p:spPr>
           <a:xfrm>
-            <a:off x="5415067" y="2408967"/>
+            <a:off x="5415067" y="2270943"/>
             <a:ext cx="1080000" cy="1080000"/>
           </a:xfrm>
           <a:prstGeom prst="ellipse">
@@ -8530,7 +8442,7 @@
         </p:nvSpPr>
         <p:spPr>
           <a:xfrm>
-            <a:off x="7020193" y="3845220"/>
+            <a:off x="6985687" y="3672690"/>
             <a:ext cx="720000" cy="720000"/>
           </a:xfrm>
           <a:prstGeom prst="ellipse">
@@ -8598,7 +8510,7 @@
         </p:nvSpPr>
         <p:spPr>
           <a:xfrm>
-            <a:off x="8057812" y="3466739"/>
+            <a:off x="8144077" y="3570257"/>
             <a:ext cx="540000" cy="540000"/>
           </a:xfrm>
           <a:prstGeom prst="ellipse">
@@ -8664,7 +8576,7 @@
         </p:nvSpPr>
         <p:spPr>
           <a:xfrm>
-            <a:off x="7712509" y="4017619"/>
+            <a:off x="7557232" y="4069378"/>
             <a:ext cx="1080000" cy="1080000"/>
           </a:xfrm>
           <a:prstGeom prst="ellipse">
@@ -9045,6 +8957,140 @@
             <a:r>
               <a:rPr lang="fr-FR" sz="1200" dirty="0" smtClean="0"/>
               <a:t>* Comprend restaurants, bars, cafés et discothèques</a:t>
+            </a:r>
+          </a:p>
+        </p:txBody>
+      </p:sp>
+      <p:sp>
+        <p:nvSpPr>
+          <p:cNvPr id="21" name="ZoneTexte 20"/>
+          <p:cNvSpPr txBox="1"/>
+          <p:nvPr/>
+        </p:nvSpPr>
+        <p:spPr>
+          <a:xfrm>
+            <a:off x="4622725" y="3318455"/>
+            <a:ext cx="907744" cy="523220"/>
+          </a:xfrm>
+          <a:prstGeom prst="rect">
+            <a:avLst/>
+          </a:prstGeom>
+          <a:noFill/>
+        </p:spPr>
+        <p:txBody>
+          <a:bodyPr wrap="square" rtlCol="0">
+            <a:spAutoFit/>
+          </a:bodyPr>
+          <a:lstStyle/>
+          <a:p>
+            <a:pPr algn="ctr">
+              <a:spcAft>
+                <a:spcPts val="600"/>
+              </a:spcAft>
+            </a:pPr>
+            <a:r>
+              <a:rPr lang="fr-FR" sz="2800" b="1" dirty="0" smtClean="0">
+                <a:solidFill>
+                  <a:schemeClr val="tx1">
+                    <a:lumMod val="50000"/>
+                    <a:lumOff val="50000"/>
+                  </a:schemeClr>
+                </a:solidFill>
+              </a:rPr>
+              <a:t>45%</a:t>
+            </a:r>
+          </a:p>
+        </p:txBody>
+      </p:sp>
+      <p:sp>
+        <p:nvSpPr>
+          <p:cNvPr id="22" name="ZoneTexte 21"/>
+          <p:cNvSpPr txBox="1"/>
+          <p:nvPr/>
+        </p:nvSpPr>
+        <p:spPr>
+          <a:xfrm>
+            <a:off x="5979198" y="3318455"/>
+            <a:ext cx="907744" cy="523220"/>
+          </a:xfrm>
+          <a:prstGeom prst="rect">
+            <a:avLst/>
+          </a:prstGeom>
+          <a:noFill/>
+        </p:spPr>
+        <p:txBody>
+          <a:bodyPr wrap="square" rtlCol="0">
+            <a:spAutoFit/>
+          </a:bodyPr>
+          <a:lstStyle/>
+          <a:p>
+            <a:pPr algn="ctr">
+              <a:spcAft>
+                <a:spcPts val="600"/>
+              </a:spcAft>
+            </a:pPr>
+            <a:r>
+              <a:rPr lang="fr-FR" sz="2800" b="1" dirty="0" smtClean="0">
+                <a:solidFill>
+                  <a:schemeClr val="tx1">
+                    <a:lumMod val="50000"/>
+                    <a:lumOff val="50000"/>
+                  </a:schemeClr>
+                </a:solidFill>
+              </a:rPr>
+              <a:t>30%</a:t>
+            </a:r>
+          </a:p>
+        </p:txBody>
+      </p:sp>
+      <p:sp>
+        <p:nvSpPr>
+          <p:cNvPr id="23" name="ZoneTexte 22"/>
+          <p:cNvSpPr txBox="1"/>
+          <p:nvPr/>
+        </p:nvSpPr>
+        <p:spPr>
+          <a:xfrm>
+            <a:off x="7410857" y="3318455"/>
+            <a:ext cx="907744" cy="523220"/>
+          </a:xfrm>
+          <a:prstGeom prst="rect">
+            <a:avLst/>
+          </a:prstGeom>
+          <a:noFill/>
+        </p:spPr>
+        <p:txBody>
+          <a:bodyPr wrap="square" rtlCol="0">
+            <a:spAutoFit/>
+          </a:bodyPr>
+          <a:lstStyle/>
+          <a:p>
+            <a:pPr algn="ctr">
+              <a:spcAft>
+                <a:spcPts val="600"/>
+              </a:spcAft>
+            </a:pPr>
+            <a:r>
+              <a:rPr lang="fr-FR" sz="2800" b="1" dirty="0">
+                <a:solidFill>
+                  <a:schemeClr val="tx1">
+                    <a:lumMod val="50000"/>
+                    <a:lumOff val="50000"/>
+                  </a:schemeClr>
+                </a:solidFill>
+              </a:rPr>
+              <a:t>2</a:t>
+            </a:r>
+            <a:r>
+              <a:rPr lang="fr-FR" sz="2800" b="1" dirty="0" smtClean="0">
+                <a:solidFill>
+                  <a:schemeClr val="tx1">
+                    <a:lumMod val="50000"/>
+                    <a:lumOff val="50000"/>
+                  </a:schemeClr>
+                </a:solidFill>
+              </a:rPr>
+              <a:t>0%</a:t>
             </a:r>
           </a:p>
         </p:txBody>
@@ -9483,8 +9529,21 @@
           </a:p>
           <a:p>
             <a:r>
+              <a:rPr lang="fr-CH" dirty="0" smtClean="0"/>
+              <a:t>L’amortissement de vos installations de production</a:t>
+            </a:r>
+          </a:p>
+          <a:p>
+            <a:pPr lvl="1"/>
+            <a:r>
+              <a:rPr lang="fr-CH" dirty="0" smtClean="0"/>
+              <a:t>Sur 10 ans de manière linéaire 3’750.- CHF</a:t>
+            </a:r>
+          </a:p>
+          <a:p>
+            <a:r>
               <a:rPr lang="fr-CH" b="1" dirty="0" smtClean="0"/>
-              <a:t>La totalité des frais fixes à couvrir sont de 43’500.-/mois</a:t>
+              <a:t>La totalité des frais fixes à couvrir sont de 47’250.-/mois</a:t>
             </a:r>
             <a:endParaRPr lang="fr-FR" b="1" dirty="0"/>
           </a:p>
@@ -9572,15 +9631,7 @@
           <a:p>
             <a:r>
               <a:rPr lang="fr-FR" dirty="0" smtClean="0"/>
-              <a:t>Prix de revient </a:t>
-            </a:r>
-            <a:r>
-              <a:rPr lang="fr-FR" dirty="0" smtClean="0"/>
-              <a:t>brut de </a:t>
-            </a:r>
-            <a:r>
-              <a:rPr lang="fr-FR" dirty="0" smtClean="0"/>
-              <a:t>40 hectolitres</a:t>
+              <a:t>Prix de revient brut de 40 hectolitres</a:t>
             </a:r>
             <a:endParaRPr lang="fr-FR" dirty="0"/>
           </a:p>
@@ -9596,7 +9647,7 @@
             <p:ph sz="quarter" idx="10"/>
             <p:extLst>
               <p:ext uri="{D42A27DB-BD31-4B8C-83A1-F6EECF244321}">
-                <p14:modId xmlns:p14="http://schemas.microsoft.com/office/powerpoint/2010/main" val="844317228"/>
+                <p14:modId xmlns:p14="http://schemas.microsoft.com/office/powerpoint/2010/main" val="703855697"/>
               </p:ext>
             </p:extLst>
           </p:nvPr>
@@ -13936,11 +13987,7 @@
                       <a:pPr algn="ctr"/>
                       <a:r>
                         <a:rPr lang="fr-FR" b="1" dirty="0" smtClean="0"/>
-                        <a:t>7’262</a:t>
-                      </a:r>
-                      <a:r>
-                        <a:rPr lang="fr-FR" b="1" dirty="0" smtClean="0"/>
-                        <a:t>.-</a:t>
+                        <a:t>7’262.-</a:t>
                       </a:r>
                       <a:endParaRPr lang="fr-FR" b="1" dirty="0"/>
                     </a:p>
@@ -14240,11 +14287,7 @@
                       <a:pPr algn="ctr"/>
                       <a:r>
                         <a:rPr lang="fr-FR" b="1" dirty="0" smtClean="0"/>
-                        <a:t>8’862</a:t>
-                      </a:r>
-                      <a:r>
-                        <a:rPr lang="fr-FR" b="1" dirty="0" smtClean="0"/>
-                        <a:t>.-</a:t>
+                        <a:t>8’862.-</a:t>
                       </a:r>
                       <a:endParaRPr lang="fr-FR" b="1" dirty="0"/>
                     </a:p>
@@ -14408,15 +14451,7 @@
                       <a:pPr algn="ctr"/>
                       <a:r>
                         <a:rPr lang="fr-FR" b="1" dirty="0" smtClean="0"/>
-                        <a:t> </a:t>
-                      </a:r>
-                      <a:r>
-                        <a:rPr lang="fr-FR" b="1" dirty="0" smtClean="0"/>
-                        <a:t>1.8155 </a:t>
-                      </a:r>
-                      <a:r>
-                        <a:rPr lang="fr-FR" b="1" dirty="0" smtClean="0"/>
-                        <a:t>CHF</a:t>
+                        <a:t> 1.8155 CHF</a:t>
                       </a:r>
                       <a:endParaRPr lang="fr-FR" b="1" dirty="0"/>
                     </a:p>
@@ -14516,11 +14551,7 @@
                       <a:pPr algn="ctr"/>
                       <a:r>
                         <a:rPr lang="fr-FR" b="1" dirty="0" smtClean="0"/>
-                        <a:t>2.0447 </a:t>
-                      </a:r>
-                      <a:r>
-                        <a:rPr lang="fr-FR" b="1" dirty="0" smtClean="0"/>
-                        <a:t>CHF</a:t>
+                        <a:t>2.0447 CHF</a:t>
                       </a:r>
                       <a:endParaRPr lang="fr-FR" b="1" dirty="0"/>
                     </a:p>
@@ -14620,11 +14651,7 @@
                       <a:pPr algn="ctr"/>
                       <a:r>
                         <a:rPr lang="fr-FR" b="1" dirty="0" smtClean="0"/>
-                        <a:t>1.8508 </a:t>
-                      </a:r>
-                      <a:r>
-                        <a:rPr lang="fr-FR" b="1" dirty="0" smtClean="0"/>
-                        <a:t>CHF</a:t>
+                        <a:t>1.8508 CHF</a:t>
                       </a:r>
                       <a:endParaRPr lang="fr-FR" b="1" dirty="0"/>
                     </a:p>
@@ -14724,11 +14751,7 @@
                       <a:pPr algn="ctr"/>
                       <a:r>
                         <a:rPr lang="fr-FR" b="1" dirty="0" smtClean="0"/>
-                        <a:t>2.2155 </a:t>
-                      </a:r>
-                      <a:r>
-                        <a:rPr lang="fr-FR" b="1" dirty="0" smtClean="0"/>
-                        <a:t>CHF</a:t>
+                        <a:t>2.2155 CHF</a:t>
                       </a:r>
                       <a:endParaRPr lang="fr-FR" b="1" dirty="0"/>
                     </a:p>
@@ -15146,6 +15169,16 @@
             <a:r>
               <a:rPr lang="fr-FR" sz="2800" b="1" dirty="0" smtClean="0"/>
               <a:t>08’500.00 CHF</a:t>
+            </a:r>
+          </a:p>
+          <a:p>
+            <a:pPr marL="457200" indent="-457200">
+              <a:buFontTx/>
+              <a:buChar char="-"/>
+            </a:pPr>
+            <a:r>
+              <a:rPr lang="fr-FR" sz="2800" b="1" dirty="0" smtClean="0"/>
+              <a:t>03’750.00 CHF</a:t>
             </a:r>
             <a:endParaRPr lang="fr-FR" sz="2800" b="1" dirty="0"/>
           </a:p>
@@ -15440,8 +15473,8 @@
         </p:nvSpPr>
         <p:spPr>
           <a:xfrm>
-            <a:off x="2723078" y="5299995"/>
-            <a:ext cx="1882246" cy="338554"/>
+            <a:off x="2723077" y="5299995"/>
+            <a:ext cx="1882247" cy="338554"/>
           </a:xfrm>
           <a:prstGeom prst="rect">
             <a:avLst/>
@@ -15461,7 +15494,7 @@
                   <a:srgbClr val="DC7488"/>
                 </a:solidFill>
               </a:rPr>
-              <a:t>65’580.- frais totaux</a:t>
+              <a:t>69’330.- frais totaux</a:t>
             </a:r>
             <a:endParaRPr lang="fr-FR" sz="1600" b="1" dirty="0">
               <a:solidFill>
@@ -15546,7 +15579,7 @@
                   </a:schemeClr>
                 </a:solidFill>
               </a:rPr>
-              <a:t>1.37</a:t>
+              <a:t>1.45</a:t>
             </a:r>
             <a:endParaRPr lang="fr-FR" sz="3600" b="1" dirty="0">
               <a:solidFill>
@@ -16389,9 +16422,104 @@
           <a:p>
             <a:r>
               <a:rPr lang="fr-FR" dirty="0" smtClean="0"/>
-              <a:t>Durant l’année la demande évolue d’un produit à l’autre</a:t>
+              <a:t>Durant l’année </a:t>
+            </a:r>
+            <a:r>
+              <a:rPr lang="fr-FR" dirty="0" smtClean="0"/>
+              <a:t>le volume de </a:t>
+            </a:r>
+            <a:r>
+              <a:rPr lang="fr-FR" dirty="0" smtClean="0"/>
+              <a:t>demande </a:t>
+            </a:r>
+            <a:r>
+              <a:rPr lang="fr-FR" dirty="0" smtClean="0"/>
+              <a:t>évolue :</a:t>
+            </a:r>
+          </a:p>
+          <a:p>
+            <a:pPr marL="0" indent="0">
+              <a:buNone/>
+              <a:tabLst>
+                <a:tab pos="703263" algn="l"/>
+                <a:tab pos="1457325" algn="l"/>
+                <a:tab pos="3636963" algn="l"/>
+                <a:tab pos="5765800" algn="l"/>
+                <a:tab pos="7910513" algn="l"/>
+              </a:tabLst>
+            </a:pPr>
+            <a:r>
+              <a:rPr lang="fr-FR" dirty="0" smtClean="0"/>
+              <a:t>		Hiver	Printemps	Eté	Automne</a:t>
+            </a:r>
+          </a:p>
+          <a:p>
+            <a:pPr marL="0" indent="0">
+              <a:buNone/>
+              <a:tabLst>
+                <a:tab pos="703263" algn="l"/>
+                <a:tab pos="1457325" algn="l"/>
+                <a:tab pos="3636963" algn="l"/>
+                <a:tab pos="5765800" algn="l"/>
+                <a:tab pos="7910513" algn="l"/>
+              </a:tabLst>
+            </a:pPr>
+            <a:r>
+              <a:rPr lang="fr-FR" dirty="0" smtClean="0"/>
+              <a:t>BW01	+0%	+5%	+20%	-5%</a:t>
+            </a:r>
+          </a:p>
+          <a:p>
+            <a:pPr marL="0" indent="0">
+              <a:buNone/>
+              <a:tabLst>
+                <a:tab pos="703263" algn="l"/>
+                <a:tab pos="1457325" algn="l"/>
+                <a:tab pos="3636963" algn="l"/>
+                <a:tab pos="5765800" algn="l"/>
+                <a:tab pos="7910513" algn="l"/>
+              </a:tabLst>
+            </a:pPr>
+            <a:r>
+              <a:rPr lang="fr-FR" dirty="0" smtClean="0"/>
+              <a:t>BW02	+8%	-3%	-3%	+5%</a:t>
+            </a:r>
+          </a:p>
+          <a:p>
+            <a:pPr marL="0" indent="0">
+              <a:buNone/>
+              <a:tabLst>
+                <a:tab pos="703263" algn="l"/>
+                <a:tab pos="1457325" algn="l"/>
+                <a:tab pos="3636963" algn="l"/>
+                <a:tab pos="5765800" algn="l"/>
+                <a:tab pos="7910513" algn="l"/>
+              </a:tabLst>
+            </a:pPr>
+            <a:r>
+              <a:rPr lang="fr-FR" dirty="0" smtClean="0"/>
+              <a:t>BW03	+0%	+0%	+0%	+0%</a:t>
+            </a:r>
+          </a:p>
+          <a:p>
+            <a:pPr marL="0" indent="0">
+              <a:buNone/>
+              <a:tabLst>
+                <a:tab pos="703263" algn="l"/>
+                <a:tab pos="1457325" algn="l"/>
+                <a:tab pos="3636963" algn="l"/>
+                <a:tab pos="5765800" algn="l"/>
+                <a:tab pos="7910513" algn="l"/>
+              </a:tabLst>
+            </a:pPr>
+            <a:r>
+              <a:rPr lang="fr-FR" dirty="0" smtClean="0"/>
+              <a:t>BW04	+15%	-20%	-30%	+45%</a:t>
             </a:r>
             <a:endParaRPr lang="fr-FR" dirty="0"/>
+          </a:p>
+          <a:p>
+            <a:endParaRPr lang="fr-FR" dirty="0" smtClean="0"/>
           </a:p>
         </p:txBody>
       </p:sp>
@@ -16423,27 +16551,6 @@
           </a:p>
         </p:txBody>
       </p:sp>
-      <p:pic>
-        <p:nvPicPr>
-          <p:cNvPr id="5" name="Image 4"/>
-          <p:cNvPicPr/>
-          <p:nvPr/>
-        </p:nvPicPr>
-        <p:blipFill rotWithShape="1">
-          <a:blip r:embed="rId2"/>
-          <a:srcRect t="7134" b="3541"/>
-          <a:stretch/>
-        </p:blipFill>
-        <p:spPr>
-          <a:xfrm>
-            <a:off x="2898895" y="2339776"/>
-            <a:ext cx="6394210" cy="3735421"/>
-          </a:xfrm>
-          <a:prstGeom prst="rect">
-            <a:avLst/>
-          </a:prstGeom>
-        </p:spPr>
-      </p:pic>
     </p:spTree>
     <p:extLst>
       <p:ext uri="{BB962C8B-B14F-4D97-AF65-F5344CB8AC3E}">
@@ -16916,15 +17023,7 @@
           <a:p>
             <a:r>
               <a:rPr lang="fr-FR" dirty="0" smtClean="0"/>
-              <a:t>Chaque round comporte </a:t>
-            </a:r>
-            <a:r>
-              <a:rPr lang="fr-FR" dirty="0" smtClean="0"/>
-              <a:t>10 </a:t>
-            </a:r>
-            <a:r>
-              <a:rPr lang="fr-FR" dirty="0" smtClean="0"/>
-              <a:t>semaines</a:t>
+              <a:t>Chaque round comporte 10 semaines</a:t>
             </a:r>
           </a:p>
         </p:txBody>
@@ -16981,15 +17080,7 @@
           <a:p>
             <a:r>
               <a:rPr lang="fr-FR" sz="2800" b="1" dirty="0" smtClean="0"/>
-              <a:t>1 round = </a:t>
-            </a:r>
-            <a:r>
-              <a:rPr lang="fr-FR" sz="2800" b="1" dirty="0" smtClean="0"/>
-              <a:t>10 </a:t>
-            </a:r>
-            <a:r>
-              <a:rPr lang="fr-FR" sz="2800" b="1" dirty="0" smtClean="0"/>
-              <a:t>minutes</a:t>
+              <a:t>1 round = 10 minutes</a:t>
             </a:r>
             <a:endParaRPr lang="fr-FR" sz="2800" b="1" dirty="0"/>
           </a:p>
@@ -17049,19 +17140,7 @@
           <a:p>
             <a:r>
               <a:rPr lang="fr-FR" sz="2800" b="1" dirty="0" smtClean="0"/>
-              <a:t>1 partie = </a:t>
-            </a:r>
-            <a:r>
-              <a:rPr lang="fr-FR" sz="2800" b="1" dirty="0" smtClean="0"/>
-              <a:t>40</a:t>
-            </a:r>
-            <a:r>
-              <a:rPr lang="fr-FR" sz="2800" b="1" dirty="0" smtClean="0"/>
-              <a:t> </a:t>
-            </a:r>
-            <a:r>
-              <a:rPr lang="fr-FR" sz="2800" b="1" dirty="0" smtClean="0"/>
-              <a:t>minutes</a:t>
+              <a:t>1 partie = 40 minutes</a:t>
             </a:r>
             <a:endParaRPr lang="fr-FR" sz="2800" b="1" dirty="0"/>
           </a:p>
@@ -17508,11 +17587,7 @@
             </a:br>
             <a:r>
               <a:rPr lang="fr-FR" dirty="0" smtClean="0"/>
-              <a:t>C’est parti jusqu’à la semaine </a:t>
-            </a:r>
-            <a:r>
-              <a:rPr lang="fr-FR" dirty="0" smtClean="0"/>
-              <a:t>20</a:t>
+              <a:t>C’est parti jusqu’à la semaine 20</a:t>
             </a:r>
             <a:endParaRPr lang="fr-FR" dirty="0"/>
           </a:p>
@@ -17899,11 +17974,7 @@
             </a:pPr>
             <a:r>
               <a:rPr lang="fr-FR" sz="4000" dirty="0" smtClean="0"/>
-              <a:t>C’est </a:t>
-            </a:r>
-            <a:r>
-              <a:rPr lang="fr-FR" sz="4000" dirty="0" smtClean="0"/>
-              <a:t>terminé</a:t>
+              <a:t>C’est terminé</a:t>
             </a:r>
           </a:p>
           <a:p>
@@ -18033,11 +18104,7 @@
           <a:p>
             <a:r>
               <a:rPr lang="fr-FR" dirty="0" smtClean="0"/>
-              <a:t>Diviser</a:t>
-            </a:r>
-            <a:r>
-              <a:rPr lang="fr-FR" dirty="0" smtClean="0"/>
-              <a:t> l’</a:t>
+              <a:t>Diviser l’</a:t>
             </a:r>
             <a:r>
               <a:rPr lang="fr-FR" dirty="0" err="1" smtClean="0"/>
@@ -18045,19 +18112,7 @@
             </a:r>
             <a:r>
               <a:rPr lang="fr-FR" dirty="0" smtClean="0"/>
-              <a:t> en </a:t>
-            </a:r>
-            <a:r>
-              <a:rPr lang="fr-FR" dirty="0" smtClean="0"/>
-              <a:t>groupe </a:t>
-            </a:r>
-            <a:r>
-              <a:rPr lang="fr-FR" dirty="0" smtClean="0"/>
-              <a:t>de </a:t>
-            </a:r>
-            <a:r>
-              <a:rPr lang="fr-FR" dirty="0" smtClean="0"/>
-              <a:t>3 à 4 personnes</a:t>
+              <a:t> en groupe de 3 à 4 personnes</a:t>
             </a:r>
           </a:p>
           <a:p>
@@ -19728,15 +19783,7 @@
           <a:p>
             <a:r>
               <a:rPr lang="fr-FR" dirty="0" smtClean="0"/>
-              <a:t>Votre processus de fabrication s’étale sur </a:t>
-            </a:r>
-            <a:r>
-              <a:rPr lang="fr-FR" dirty="0" smtClean="0"/>
-              <a:t>5 </a:t>
-            </a:r>
-            <a:r>
-              <a:rPr lang="fr-FR" dirty="0" smtClean="0"/>
-              <a:t>jours</a:t>
+              <a:t>Votre processus de fabrication s’étale sur 5 jours</a:t>
             </a:r>
             <a:endParaRPr lang="fr-FR" dirty="0"/>
           </a:p>

</xml_diff>